<commit_message>
I found the last version of interatomicDistances.py  Great!
</commit_message>
<xml_diff>
--- a/моделирование движения водорода в кристалле палладия.pptx
+++ b/моделирование движения водорода в кристалле палладия.pptx
@@ -204,7 +204,7 @@
             <a:fld id="{B5378A71-BFFC-4D5A-A934-D8B9B1EE01A2}" type="datetimeFigureOut">
               <a:rPr lang="ru-RU" smtClean="0"/>
               <a:pPr/>
-              <a:t>24.04.2015</a:t>
+              <a:t>15.06.2015</a:t>
             </a:fld>
             <a:endParaRPr lang="ru-RU"/>
           </a:p>
@@ -655,7 +655,7 @@
             <a:fld id="{C822FAF8-6BF3-4FD3-A526-D814D53B85D3}" type="datetime1">
               <a:rPr lang="ru-RU" smtClean="0"/>
               <a:pPr/>
-              <a:t>24.04.2015</a:t>
+              <a:t>15.06.2015</a:t>
             </a:fld>
             <a:endParaRPr lang="ru-RU"/>
           </a:p>
@@ -827,7 +827,7 @@
             <a:fld id="{A0B19FE8-7CDB-4CA9-96B2-BB24C158451E}" type="datetime1">
               <a:rPr lang="ru-RU" smtClean="0"/>
               <a:pPr/>
-              <a:t>24.04.2015</a:t>
+              <a:t>15.06.2015</a:t>
             </a:fld>
             <a:endParaRPr lang="ru-RU"/>
           </a:p>
@@ -1009,7 +1009,7 @@
             <a:fld id="{214BE112-8A84-497C-A41E-21E14EC273C6}" type="datetime1">
               <a:rPr lang="ru-RU" smtClean="0"/>
               <a:pPr/>
-              <a:t>24.04.2015</a:t>
+              <a:t>15.06.2015</a:t>
             </a:fld>
             <a:endParaRPr lang="ru-RU"/>
           </a:p>
@@ -1181,7 +1181,7 @@
             <a:fld id="{EB803070-3C05-4E49-829B-D695077A48F0}" type="datetime1">
               <a:rPr lang="ru-RU" smtClean="0"/>
               <a:pPr/>
-              <a:t>24.04.2015</a:t>
+              <a:t>15.06.2015</a:t>
             </a:fld>
             <a:endParaRPr lang="ru-RU"/>
           </a:p>
@@ -1429,7 +1429,7 @@
             <a:fld id="{5FFC403E-AF9E-4918-996C-2B4C38CDEB5B}" type="datetime1">
               <a:rPr lang="ru-RU" smtClean="0"/>
               <a:pPr/>
-              <a:t>24.04.2015</a:t>
+              <a:t>15.06.2015</a:t>
             </a:fld>
             <a:endParaRPr lang="ru-RU"/>
           </a:p>
@@ -1719,7 +1719,7 @@
             <a:fld id="{B55EBDE1-F518-46D5-AC4F-99AAFCBEC1C3}" type="datetime1">
               <a:rPr lang="ru-RU" smtClean="0"/>
               <a:pPr/>
-              <a:t>24.04.2015</a:t>
+              <a:t>15.06.2015</a:t>
             </a:fld>
             <a:endParaRPr lang="ru-RU"/>
           </a:p>
@@ -2143,7 +2143,7 @@
             <a:fld id="{758E9C45-5334-433C-8BE3-7CF931C4E1AF}" type="datetime1">
               <a:rPr lang="ru-RU" smtClean="0"/>
               <a:pPr/>
-              <a:t>24.04.2015</a:t>
+              <a:t>15.06.2015</a:t>
             </a:fld>
             <a:endParaRPr lang="ru-RU"/>
           </a:p>
@@ -2263,7 +2263,7 @@
             <a:fld id="{F14BA91F-758A-4195-936B-6265878343F5}" type="datetime1">
               <a:rPr lang="ru-RU" smtClean="0"/>
               <a:pPr/>
-              <a:t>24.04.2015</a:t>
+              <a:t>15.06.2015</a:t>
             </a:fld>
             <a:endParaRPr lang="ru-RU"/>
           </a:p>
@@ -2360,7 +2360,7 @@
             <a:fld id="{AFAC4046-6EB7-451E-831F-DB684D52B837}" type="datetime1">
               <a:rPr lang="ru-RU" smtClean="0"/>
               <a:pPr/>
-              <a:t>24.04.2015</a:t>
+              <a:t>15.06.2015</a:t>
             </a:fld>
             <a:endParaRPr lang="ru-RU"/>
           </a:p>
@@ -2639,7 +2639,7 @@
             <a:fld id="{987842AC-A46B-4780-8EE7-E44DB6DD9B14}" type="datetime1">
               <a:rPr lang="ru-RU" smtClean="0"/>
               <a:pPr/>
-              <a:t>24.04.2015</a:t>
+              <a:t>15.06.2015</a:t>
             </a:fld>
             <a:endParaRPr lang="ru-RU"/>
           </a:p>
@@ -2894,7 +2894,7 @@
             <a:fld id="{27BFEA9B-44F9-4333-ADDA-A1137FE669B4}" type="datetime1">
               <a:rPr lang="ru-RU" smtClean="0"/>
               <a:pPr/>
-              <a:t>24.04.2015</a:t>
+              <a:t>15.06.2015</a:t>
             </a:fld>
             <a:endParaRPr lang="ru-RU"/>
           </a:p>
@@ -3109,7 +3109,7 @@
             <a:fld id="{C193BF6A-F562-4767-A93D-44E694B77411}" type="datetime1">
               <a:rPr lang="ru-RU" smtClean="0"/>
               <a:pPr/>
-              <a:t>24.04.2015</a:t>
+              <a:t>15.06.2015</a:t>
             </a:fld>
             <a:endParaRPr lang="ru-RU"/>
           </a:p>
@@ -5774,7 +5774,15 @@
             </a:r>
             <a:r>
               <a:rPr lang="en-US" dirty="0" smtClean="0"/>
-              <a:t>(x = 0.75)</a:t>
+              <a:t>(x </a:t>
+            </a:r>
+            <a:r>
+              <a:rPr lang="en-US" smtClean="0"/>
+              <a:t>= </a:t>
+            </a:r>
+            <a:r>
+              <a:rPr lang="en-US" smtClean="0"/>
+              <a:t>1)</a:t>
             </a:r>
             <a:endParaRPr lang="ru-RU" dirty="0"/>
           </a:p>

</xml_diff>

<commit_message>
most of the work is done
</commit_message>
<xml_diff>
--- a/моделирование движения водорода в кристалле палладия.pptx
+++ b/моделирование движения водорода в кристалле палладия.pptx
@@ -5774,15 +5774,7 @@
             </a:r>
             <a:r>
               <a:rPr lang="en-US" dirty="0" smtClean="0"/>
-              <a:t>(x </a:t>
-            </a:r>
-            <a:r>
-              <a:rPr lang="en-US" smtClean="0"/>
-              <a:t>= </a:t>
-            </a:r>
-            <a:r>
-              <a:rPr lang="en-US" smtClean="0"/>
-              <a:t>1)</a:t>
+              <a:t>(x = 1)</a:t>
             </a:r>
             <a:endParaRPr lang="ru-RU" dirty="0"/>
           </a:p>

</xml_diff>